<commit_message>
Update Visual Studio에서 라이브러리 연동하기.pptx
문구 수정
</commit_message>
<xml_diff>
--- a/Visual Studio에서 라이브러리 연동하기.pptx
+++ b/Visual Studio에서 라이브러리 연동하기.pptx
@@ -130,7 +130,7 @@
 <file path=ppt/revisionInfo.xml><?xml version="1.0" encoding="utf-8"?>
 <p1510:revInfo xmlns:a="http://schemas.openxmlformats.org/drawingml/2006/main" xmlns:r="http://schemas.openxmlformats.org/officeDocument/2006/relationships" xmlns:p1510="http://schemas.microsoft.com/office/powerpoint/2015/10/main">
   <p1510:revLst>
-    <p1510:client id="{98A3F4F5-7BEC-4B73-B710-562B24F1C1D4}" v="1752" dt="2024-06-22T16:12:57.221"/>
+    <p1510:client id="{98A3F4F5-7BEC-4B73-B710-562B24F1C1D4}" v="1797" dt="2024-06-24T17:28:21.759"/>
   </p1510:revLst>
 </p1510:revInfo>
 </file>
@@ -5868,7 +5868,12 @@
             <p:ph type="ctrTitle"/>
           </p:nvPr>
         </p:nvSpPr>
-        <p:spPr/>
+        <p:spPr>
+          <a:xfrm>
+            <a:off x="1027612" y="2404534"/>
+            <a:ext cx="8246392" cy="1646302"/>
+          </a:xfrm>
+        </p:spPr>
         <p:txBody>
           <a:bodyPr>
             <a:normAutofit fontScale="90000"/>
@@ -6457,15 +6462,7 @@
           <a:p>
             <a:r>
               <a:rPr lang="ko-KR" altLang="en-US" dirty="0"/>
-              <a:t>특히 패키지 매니저를 사용하지 않고 링크를 </a:t>
-            </a:r>
-            <a:r>
-              <a:rPr lang="ko-KR" altLang="en-US" dirty="0" err="1"/>
-              <a:t>하려다가</a:t>
-            </a:r>
-            <a:r>
-              <a:rPr lang="ko-KR" altLang="en-US" dirty="0"/>
-              <a:t> 많은 에로사항이 꽃핍니다</a:t>
+              <a:t>특히 패키지 매니저를 사용하지 않고 링크를 하려고 하다가 많은 에로사항이 꽃핍니다</a:t>
             </a:r>
             <a:r>
               <a:rPr lang="en-US" altLang="ko-KR" dirty="0"/>
@@ -7547,15 +7544,14 @@
             </a:r>
             <a:r>
               <a:rPr lang="en-US" altLang="ko-KR" dirty="0"/>
-              <a:t>’, ‘static</a:t>
-            </a:r>
-            <a:r>
-              <a:rPr lang="ko-KR" altLang="en-US" dirty="0"/>
-              <a:t>을 사용할 때 생기는 온갖 지옥</a:t>
-            </a:r>
-            <a:r>
-              <a:rPr lang="en-US" altLang="ko-KR" dirty="0"/>
-              <a:t>’ , ‘Windows</a:t>
+              <a:t>’, </a:t>
+            </a:r>
+            <a:br>
+              <a:rPr lang="en-US" altLang="ko-KR" dirty="0"/>
+            </a:br>
+            <a:r>
+              <a:rPr lang="en-US" altLang="ko-KR" dirty="0"/>
+              <a:t>‘Windows</a:t>
             </a:r>
             <a:r>
               <a:rPr lang="ko-KR" altLang="en-US" dirty="0"/>
@@ -9255,9 +9251,12 @@
             </a:r>
             <a:r>
               <a:rPr lang="ko-KR" altLang="en-US" dirty="0"/>
-              <a:t>현장에선 초음파 센서에서 들어오는 데이터를 사용한 프로그램을 만들고</a:t>
-            </a:r>
-            <a:endParaRPr lang="en-US" altLang="ko-KR" dirty="0"/>
+              <a:t>현장에선 초음파 센서에서 들어오는 데이터를 사용한 프로그램을 만듭니다</a:t>
+            </a:r>
+            <a:r>
+              <a:rPr lang="en-US" altLang="ko-KR" dirty="0"/>
+              <a:t>.</a:t>
+            </a:r>
           </a:p>
           <a:p>
             <a:r>
@@ -9266,7 +9265,7 @@
             </a:r>
             <a:r>
               <a:rPr lang="ko-KR" altLang="en-US" dirty="0"/>
-              <a:t>현장에선 광 센서에서 들어오는 데이터를 사용하여 프로그램을 만듭니다</a:t>
+              <a:t>현장에선 광 센서에서 들어오는 데이터를 사용한 프로그램을 만듭니다</a:t>
             </a:r>
             <a:r>
               <a:rPr lang="en-US" altLang="ko-KR" dirty="0"/>
@@ -9276,7 +9275,7 @@
           <a:p>
             <a:r>
               <a:rPr lang="ko-KR" altLang="en-US" dirty="0"/>
-              <a:t>두 센서는 모두 시리얼 케이블로 연결되어 들어옵니다</a:t>
+              <a:t>두 센서의 데이터는 모두 시리얼 케이블로 연결되어 들어옵니다</a:t>
             </a:r>
             <a:r>
               <a:rPr lang="en-US" altLang="ko-KR" dirty="0"/>

</xml_diff>